<commit_message>
week 4 day 1
</commit_message>
<xml_diff>
--- a/Learning Phase/Week 4/Day 1/Spring REST/Slides/3. Building the Friends Web Services/building-the-friends-web-services-slides.pptx
+++ b/Learning Phase/Week 4/Day 1/Spring REST/Slides/3. Building the Friends Web Services/building-the-friends-web-services-slides.pptx
@@ -5,41 +5,41 @@
     <p:sldMasterId id="2147483648" r:id="rId1"/>
   </p:sldMasterIdLst>
   <p:notesMasterIdLst>
-    <p:notesMasterId r:id="rId35"/>
+    <p:notesMasterId r:id="rId34"/>
   </p:notesMasterIdLst>
   <p:sldIdLst>
-    <p:sldId id="256" r:id="rId3"/>
-    <p:sldId id="258" r:id="rId4"/>
-    <p:sldId id="259" r:id="rId5"/>
-    <p:sldId id="260" r:id="rId6"/>
-    <p:sldId id="261" r:id="rId7"/>
-    <p:sldId id="262" r:id="rId8"/>
-    <p:sldId id="263" r:id="rId9"/>
-    <p:sldId id="264" r:id="rId10"/>
-    <p:sldId id="265" r:id="rId11"/>
-    <p:sldId id="266" r:id="rId12"/>
-    <p:sldId id="267" r:id="rId13"/>
-    <p:sldId id="268" r:id="rId14"/>
-    <p:sldId id="269" r:id="rId15"/>
-    <p:sldId id="270" r:id="rId16"/>
-    <p:sldId id="271" r:id="rId17"/>
-    <p:sldId id="272" r:id="rId18"/>
-    <p:sldId id="273" r:id="rId19"/>
-    <p:sldId id="274" r:id="rId20"/>
-    <p:sldId id="275" r:id="rId21"/>
-    <p:sldId id="276" r:id="rId22"/>
-    <p:sldId id="277" r:id="rId23"/>
-    <p:sldId id="278" r:id="rId24"/>
-    <p:sldId id="279" r:id="rId25"/>
-    <p:sldId id="280" r:id="rId26"/>
-    <p:sldId id="281" r:id="rId27"/>
-    <p:sldId id="282" r:id="rId28"/>
-    <p:sldId id="283" r:id="rId29"/>
-    <p:sldId id="284" r:id="rId30"/>
-    <p:sldId id="285" r:id="rId31"/>
-    <p:sldId id="286" r:id="rId32"/>
-    <p:sldId id="287" r:id="rId33"/>
-    <p:sldId id="288" r:id="rId34"/>
+    <p:sldId id="256" r:id="rId2"/>
+    <p:sldId id="258" r:id="rId3"/>
+    <p:sldId id="259" r:id="rId4"/>
+    <p:sldId id="260" r:id="rId5"/>
+    <p:sldId id="261" r:id="rId6"/>
+    <p:sldId id="262" r:id="rId7"/>
+    <p:sldId id="263" r:id="rId8"/>
+    <p:sldId id="264" r:id="rId9"/>
+    <p:sldId id="265" r:id="rId10"/>
+    <p:sldId id="266" r:id="rId11"/>
+    <p:sldId id="267" r:id="rId12"/>
+    <p:sldId id="268" r:id="rId13"/>
+    <p:sldId id="269" r:id="rId14"/>
+    <p:sldId id="270" r:id="rId15"/>
+    <p:sldId id="271" r:id="rId16"/>
+    <p:sldId id="272" r:id="rId17"/>
+    <p:sldId id="273" r:id="rId18"/>
+    <p:sldId id="274" r:id="rId19"/>
+    <p:sldId id="275" r:id="rId20"/>
+    <p:sldId id="276" r:id="rId21"/>
+    <p:sldId id="277" r:id="rId22"/>
+    <p:sldId id="278" r:id="rId23"/>
+    <p:sldId id="279" r:id="rId24"/>
+    <p:sldId id="280" r:id="rId25"/>
+    <p:sldId id="281" r:id="rId26"/>
+    <p:sldId id="282" r:id="rId27"/>
+    <p:sldId id="283" r:id="rId28"/>
+    <p:sldId id="284" r:id="rId29"/>
+    <p:sldId id="285" r:id="rId30"/>
+    <p:sldId id="286" r:id="rId31"/>
+    <p:sldId id="287" r:id="rId32"/>
+    <p:sldId id="288" r:id="rId33"/>
   </p:sldIdLst>
   <p:sldSz cx="16256000" cy="9144000"/>
   <p:notesSz cx="16256000" cy="9144000"/>
@@ -135,6 +135,22 @@
       </a:defRPr>
     </a:lvl9pPr>
   </p:defaultTextStyle>
+  <p:extLst>
+    <p:ext uri="{EFAFB233-063F-42B5-8137-9DF3F51BA10A}">
+      <p15:sldGuideLst xmlns:p15="http://schemas.microsoft.com/office/powerpoint/2012/main">
+        <p15:guide id="1" orient="horz" pos="2881">
+          <p15:clr>
+            <a:srgbClr val="A4A3A4"/>
+          </p15:clr>
+        </p15:guide>
+        <p15:guide id="2" pos="2160">
+          <p15:clr>
+            <a:srgbClr val="A4A3A4"/>
+          </p15:clr>
+        </p15:guide>
+      </p15:sldGuideLst>
+    </p:ext>
+  </p:extLst>
 </p:presentation>
 </file>
 
@@ -220,6 +236,7 @@
           <a:p>
             <a:fld id="{3EFD42F7-718C-4B98-AAEC-167E6DDD60A7}" type="datetimeFigureOut">
               <a:rPr lang="en-US" smtClean="0"/>
+              <a:t>11/2/2023</a:t>
             </a:fld>
             <a:endParaRPr lang="en-US"/>
           </a:p>
@@ -283,42 +300,37 @@
           <a:p>
             <a:pPr lvl="0"/>
             <a:r>
-              <a:rPr lang="en-US" smtClean="0"/>
+              <a:rPr lang="en-US"/>
               <a:t>Click to edit Master text styles</a:t>
             </a:r>
-            <a:endParaRPr lang="en-US" smtClean="0"/>
           </a:p>
           <a:p>
             <a:pPr lvl="1"/>
             <a:r>
-              <a:rPr lang="en-US" smtClean="0"/>
+              <a:rPr lang="en-US"/>
               <a:t>Second level</a:t>
             </a:r>
-            <a:endParaRPr lang="en-US" smtClean="0"/>
           </a:p>
           <a:p>
             <a:pPr lvl="2"/>
             <a:r>
-              <a:rPr lang="en-US" smtClean="0"/>
+              <a:rPr lang="en-US"/>
               <a:t>Third level</a:t>
             </a:r>
-            <a:endParaRPr lang="en-US" smtClean="0"/>
           </a:p>
           <a:p>
             <a:pPr lvl="3"/>
             <a:r>
-              <a:rPr lang="en-US" smtClean="0"/>
+              <a:rPr lang="en-US"/>
               <a:t>Fourth level</a:t>
             </a:r>
-            <a:endParaRPr lang="en-US" smtClean="0"/>
           </a:p>
           <a:p>
             <a:pPr lvl="4"/>
             <a:r>
-              <a:rPr lang="en-US" smtClean="0"/>
+              <a:rPr lang="en-US"/>
               <a:t>Fifth level</a:t>
             </a:r>
-            <a:endParaRPr lang="en-US"/>
           </a:p>
         </p:txBody>
       </p:sp>
@@ -382,6 +394,7 @@
           <a:p>
             <a:fld id="{21B2AA4F-B828-4D7C-AFD3-893933DAFCB4}" type="slidenum">
               <a:rPr lang="en-US" smtClean="0"/>
+              <a:t>‹#›</a:t>
             </a:fld>
             <a:endParaRPr lang="en-US"/>
           </a:p>
@@ -530,7 +543,9 @@
               <a:defRPr/>
             </a:lvl1pPr>
           </a:lstStyle>
-          <a:p/>
+          <a:p>
+            <a:endParaRPr/>
+          </a:p>
         </p:txBody>
       </p:sp>
       <p:sp>
@@ -561,7 +576,9 @@
               <a:defRPr/>
             </a:lvl1pPr>
           </a:lstStyle>
-          <a:p/>
+          <a:p>
+            <a:endParaRPr/>
+          </a:p>
         </p:txBody>
       </p:sp>
       <p:sp>
@@ -588,7 +605,9 @@
               </a:defRPr>
             </a:lvl1pPr>
           </a:lstStyle>
-          <a:p/>
+          <a:p>
+            <a:endParaRPr/>
+          </a:p>
         </p:txBody>
       </p:sp>
       <p:sp>
@@ -618,6 +637,7 @@
           <a:p>
             <a:fld id="{1D8BD707-D9CF-40AE-B4C6-C98DA3205C09}" type="datetimeFigureOut">
               <a:rPr lang="en-US"/>
+              <a:t>11/2/2023</a:t>
             </a:fld>
             <a:endParaRPr lang="en-US"/>
           </a:p>
@@ -650,6 +670,7 @@
           <a:p>
             <a:fld id="{B6F15528-21DE-4FAA-801E-634DDDAF4B2B}" type="slidenum">
               <a:rPr/>
+              <a:t>‹#›</a:t>
             </a:fld>
             <a:endParaRPr/>
           </a:p>
@@ -665,7 +686,7 @@
 </file>
 
 <file path=ppt/slideLayouts/slideLayout2.xml><?xml version="1.0" encoding="utf-8"?>
-<p:sldLayout xmlns:a="http://schemas.openxmlformats.org/drawingml/2006/main" xmlns:r="http://schemas.openxmlformats.org/officeDocument/2006/relationships" xmlns:p="http://schemas.openxmlformats.org/presentationml/2006/main" type="obj" preserve="1" showMasterSp="0">
+<p:sldLayout xmlns:a="http://schemas.openxmlformats.org/drawingml/2006/main" xmlns:r="http://schemas.openxmlformats.org/officeDocument/2006/relationships" xmlns:p="http://schemas.openxmlformats.org/presentationml/2006/main" showMasterSp="0" type="obj" preserve="1">
   <p:cSld name="Title and Content">
     <p:bg>
       <p:bgPr>
@@ -734,7 +755,9 @@
         <p:txBody>
           <a:bodyPr wrap="square" lIns="0" tIns="0" rIns="0" bIns="0" rtlCol="0"/>
           <a:lstStyle/>
-          <a:p/>
+          <a:p>
+            <a:endParaRPr/>
+          </a:p>
         </p:txBody>
       </p:sp>
       <p:sp>
@@ -761,7 +784,9 @@
               </a:defRPr>
             </a:lvl1pPr>
           </a:lstStyle>
-          <a:p/>
+          <a:p>
+            <a:endParaRPr/>
+          </a:p>
         </p:txBody>
       </p:sp>
       <p:sp>
@@ -788,7 +813,9 @@
               </a:defRPr>
             </a:lvl1pPr>
           </a:lstStyle>
-          <a:p/>
+          <a:p>
+            <a:endParaRPr/>
+          </a:p>
         </p:txBody>
       </p:sp>
       <p:sp>
@@ -815,7 +842,9 @@
               </a:defRPr>
             </a:lvl1pPr>
           </a:lstStyle>
-          <a:p/>
+          <a:p>
+            <a:endParaRPr/>
+          </a:p>
         </p:txBody>
       </p:sp>
       <p:sp>
@@ -845,6 +874,7 @@
           <a:p>
             <a:fld id="{1D8BD707-D9CF-40AE-B4C6-C98DA3205C09}" type="datetimeFigureOut">
               <a:rPr lang="en-US"/>
+              <a:t>11/2/2023</a:t>
             </a:fld>
             <a:endParaRPr lang="en-US"/>
           </a:p>
@@ -877,6 +907,7 @@
           <a:p>
             <a:fld id="{B6F15528-21DE-4FAA-801E-634DDDAF4B2B}" type="slidenum">
               <a:rPr/>
+              <a:t>‹#›</a:t>
             </a:fld>
             <a:endParaRPr/>
           </a:p>
@@ -892,7 +923,7 @@
 </file>
 
 <file path=ppt/slideLayouts/slideLayout3.xml><?xml version="1.0" encoding="utf-8"?>
-<p:sldLayout xmlns:a="http://schemas.openxmlformats.org/drawingml/2006/main" xmlns:r="http://schemas.openxmlformats.org/officeDocument/2006/relationships" xmlns:p="http://schemas.openxmlformats.org/presentationml/2006/main" type="obj" preserve="1" showMasterSp="0">
+<p:sldLayout xmlns:a="http://schemas.openxmlformats.org/drawingml/2006/main" xmlns:r="http://schemas.openxmlformats.org/officeDocument/2006/relationships" xmlns:p="http://schemas.openxmlformats.org/presentationml/2006/main" showMasterSp="0" type="obj" preserve="1">
   <p:cSld name="Two Content">
     <p:bg>
       <p:bgPr>
@@ -953,7 +984,9 @@
         <p:txBody>
           <a:bodyPr wrap="square" lIns="0" tIns="0" rIns="0" bIns="0" rtlCol="0"/>
           <a:lstStyle/>
-          <a:p/>
+          <a:p>
+            <a:endParaRPr/>
+          </a:p>
         </p:txBody>
       </p:sp>
       <p:sp>
@@ -980,7 +1013,9 @@
               </a:defRPr>
             </a:lvl1pPr>
           </a:lstStyle>
-          <a:p/>
+          <a:p>
+            <a:endParaRPr/>
+          </a:p>
         </p:txBody>
       </p:sp>
       <p:sp>
@@ -1017,7 +1052,9 @@
               </a:defRPr>
             </a:lvl1pPr>
           </a:lstStyle>
-          <a:p/>
+          <a:p>
+            <a:endParaRPr/>
+          </a:p>
         </p:txBody>
       </p:sp>
       <p:sp>
@@ -1048,7 +1085,9 @@
               <a:defRPr/>
             </a:lvl1pPr>
           </a:lstStyle>
-          <a:p/>
+          <a:p>
+            <a:endParaRPr/>
+          </a:p>
         </p:txBody>
       </p:sp>
       <p:sp>
@@ -1075,7 +1114,9 @@
               </a:defRPr>
             </a:lvl1pPr>
           </a:lstStyle>
-          <a:p/>
+          <a:p>
+            <a:endParaRPr/>
+          </a:p>
         </p:txBody>
       </p:sp>
       <p:sp>
@@ -1105,6 +1146,7 @@
           <a:p>
             <a:fld id="{1D8BD707-D9CF-40AE-B4C6-C98DA3205C09}" type="datetimeFigureOut">
               <a:rPr lang="en-US"/>
+              <a:t>11/2/2023</a:t>
             </a:fld>
             <a:endParaRPr lang="en-US"/>
           </a:p>
@@ -1137,6 +1179,7 @@
           <a:p>
             <a:fld id="{B6F15528-21DE-4FAA-801E-634DDDAF4B2B}" type="slidenum">
               <a:rPr/>
+              <a:t>‹#›</a:t>
             </a:fld>
             <a:endParaRPr/>
           </a:p>
@@ -1192,7 +1235,9 @@
               </a:defRPr>
             </a:lvl1pPr>
           </a:lstStyle>
-          <a:p/>
+          <a:p>
+            <a:endParaRPr/>
+          </a:p>
         </p:txBody>
       </p:sp>
       <p:sp>
@@ -1219,7 +1264,9 @@
               </a:defRPr>
             </a:lvl1pPr>
           </a:lstStyle>
-          <a:p/>
+          <a:p>
+            <a:endParaRPr/>
+          </a:p>
         </p:txBody>
       </p:sp>
       <p:sp>
@@ -1249,6 +1296,7 @@
           <a:p>
             <a:fld id="{1D8BD707-D9CF-40AE-B4C6-C98DA3205C09}" type="datetimeFigureOut">
               <a:rPr lang="en-US"/>
+              <a:t>11/2/2023</a:t>
             </a:fld>
             <a:endParaRPr lang="en-US"/>
           </a:p>
@@ -1281,6 +1329,7 @@
           <a:p>
             <a:fld id="{B6F15528-21DE-4FAA-801E-634DDDAF4B2B}" type="slidenum">
               <a:rPr/>
+              <a:t>‹#›</a:t>
             </a:fld>
             <a:endParaRPr/>
           </a:p>
@@ -1296,7 +1345,7 @@
 </file>
 
 <file path=ppt/slideLayouts/slideLayout5.xml><?xml version="1.0" encoding="utf-8"?>
-<p:sldLayout xmlns:a="http://schemas.openxmlformats.org/drawingml/2006/main" xmlns:r="http://schemas.openxmlformats.org/officeDocument/2006/relationships" xmlns:p="http://schemas.openxmlformats.org/presentationml/2006/main" type="obj" preserve="1" showMasterSp="0">
+<p:sldLayout xmlns:a="http://schemas.openxmlformats.org/drawingml/2006/main" xmlns:r="http://schemas.openxmlformats.org/officeDocument/2006/relationships" xmlns:p="http://schemas.openxmlformats.org/presentationml/2006/main" showMasterSp="0" type="obj" preserve="1">
   <p:cSld name="Blank">
     <p:bg>
       <p:bgPr>
@@ -1357,7 +1406,9 @@
         <p:txBody>
           <a:bodyPr wrap="square" lIns="0" tIns="0" rIns="0" bIns="0" rtlCol="0"/>
           <a:lstStyle/>
-          <a:p/>
+          <a:p>
+            <a:endParaRPr/>
+          </a:p>
         </p:txBody>
       </p:sp>
       <p:sp>
@@ -1384,7 +1435,9 @@
               </a:defRPr>
             </a:lvl1pPr>
           </a:lstStyle>
-          <a:p/>
+          <a:p>
+            <a:endParaRPr/>
+          </a:p>
         </p:txBody>
       </p:sp>
       <p:sp>
@@ -1414,6 +1467,7 @@
           <a:p>
             <a:fld id="{1D8BD707-D9CF-40AE-B4C6-C98DA3205C09}" type="datetimeFigureOut">
               <a:rPr lang="en-US"/>
+              <a:t>11/2/2023</a:t>
             </a:fld>
             <a:endParaRPr lang="en-US"/>
           </a:p>
@@ -1446,6 +1500,7 @@
           <a:p>
             <a:fld id="{B6F15528-21DE-4FAA-801E-634DDDAF4B2B}" type="slidenum">
               <a:rPr/>
+              <a:t>‹#›</a:t>
             </a:fld>
             <a:endParaRPr/>
           </a:p>
@@ -1519,7 +1574,9 @@
               </a:defRPr>
             </a:lvl1pPr>
           </a:lstStyle>
-          <a:p/>
+          <a:p>
+            <a:endParaRPr/>
+          </a:p>
         </p:txBody>
       </p:sp>
       <p:sp>
@@ -1556,7 +1613,9 @@
               </a:defRPr>
             </a:lvl1pPr>
           </a:lstStyle>
-          <a:p/>
+          <a:p>
+            <a:endParaRPr/>
+          </a:p>
         </p:txBody>
       </p:sp>
       <p:sp>
@@ -1593,7 +1652,9 @@
               </a:defRPr>
             </a:lvl1pPr>
           </a:lstStyle>
-          <a:p/>
+          <a:p>
+            <a:endParaRPr/>
+          </a:p>
         </p:txBody>
       </p:sp>
       <p:sp>
@@ -1633,6 +1694,7 @@
           <a:p>
             <a:fld id="{1D8BD707-D9CF-40AE-B4C6-C98DA3205C09}" type="datetimeFigureOut">
               <a:rPr lang="en-US"/>
+              <a:t>11/2/2023</a:t>
             </a:fld>
             <a:endParaRPr lang="en-US"/>
           </a:p>
@@ -1675,6 +1737,7 @@
           <a:p>
             <a:fld id="{B6F15528-21DE-4FAA-801E-634DDDAF4B2B}" type="slidenum">
               <a:rPr/>
+              <a:t>‹#›</a:t>
             </a:fld>
             <a:endParaRPr/>
           </a:p>
@@ -1859,7 +1922,7 @@
           <p:nvPr/>
         </p:nvPicPr>
         <p:blipFill>
-          <a:blip r:embed="rId1" cstate="print"/>
+          <a:blip r:embed="rId2" cstate="print"/>
           <a:stretch>
             <a:fillRect/>
           </a:stretch>
@@ -2057,9 +2120,11 @@
         <p:spPr/>
         <p:txBody>
           <a:bodyPr/>
+          <a:lstStyle/>
           <a:p>
             <a:fld id="{B6F15528-21DE-4FAA-801E-634DDDAF4B2B}" type="slidenum">
               <a:rPr/>
+              <a:t>1</a:t>
             </a:fld>
             <a:endParaRPr/>
           </a:p>
@@ -2179,11 +2244,6 @@
               </a:rPr>
               <a:t>root</a:t>
             </a:r>
-            <a:endParaRPr spc="-5" dirty="0">
-              <a:solidFill>
-                <a:srgbClr val="5F7FAA"/>
-              </a:solidFill>
-            </a:endParaRPr>
           </a:p>
         </p:txBody>
       </p:sp>
@@ -2492,9 +2552,11 @@
         <p:spPr/>
         <p:txBody>
           <a:bodyPr/>
+          <a:lstStyle/>
           <a:p>
             <a:fld id="{B6F15528-21DE-4FAA-801E-634DDDAF4B2B}" type="slidenum">
               <a:rPr/>
+              <a:t>10</a:t>
             </a:fld>
             <a:endParaRPr/>
           </a:p>
@@ -2724,13 +2786,6 @@
               </a:rPr>
               <a:t>Architecture</a:t>
             </a:r>
-            <a:endParaRPr spc="-10" dirty="0">
-              <a:solidFill>
-                <a:srgbClr val="5E5E5E"/>
-              </a:solidFill>
-              <a:latin typeface="Tahoma" panose="020B0604030504040204"/>
-              <a:cs typeface="Tahoma" panose="020B0604030504040204"/>
-            </a:endParaRPr>
           </a:p>
         </p:txBody>
       </p:sp>
@@ -3053,9 +3108,11 @@
         <p:spPr/>
         <p:txBody>
           <a:bodyPr/>
+          <a:lstStyle/>
           <a:p>
             <a:fld id="{B6F15528-21DE-4FAA-801E-634DDDAF4B2B}" type="slidenum">
               <a:rPr/>
+              <a:t>11</a:t>
             </a:fld>
             <a:endParaRPr/>
           </a:p>
@@ -3127,11 +3184,6 @@
               </a:rPr>
               <a:t>@Entity</a:t>
             </a:r>
-            <a:endParaRPr spc="-5" dirty="0">
-              <a:solidFill>
-                <a:srgbClr val="BBB529"/>
-              </a:solidFill>
-            </a:endParaRPr>
           </a:p>
           <a:p>
             <a:pPr marL="12700">
@@ -3183,7 +3235,6 @@
               <a:rPr dirty="0"/>
               <a:t>{</a:t>
             </a:r>
-            <a:endParaRPr dirty="0"/>
           </a:p>
         </p:txBody>
       </p:sp>
@@ -3226,7 +3277,7 @@
               </a:rPr>
               <a:t>@Id</a:t>
             </a:r>
-            <a:endParaRPr sz="3200">
+            <a:endParaRPr sz="3200" dirty="0">
               <a:latin typeface="Arial MT"/>
               <a:cs typeface="Arial MT"/>
             </a:endParaRPr>
@@ -3390,7 +3441,7 @@
               </a:rPr>
               <a:t>;</a:t>
             </a:r>
-            <a:endParaRPr sz="3200">
+            <a:endParaRPr sz="3200" dirty="0">
               <a:latin typeface="Arial MT"/>
               <a:cs typeface="Arial MT"/>
             </a:endParaRPr>
@@ -3404,7 +3455,7 @@
                 <a:spcPts val="5"/>
               </a:spcBef>
             </a:pPr>
-            <a:endParaRPr sz="3300">
+            <a:endParaRPr sz="3300" dirty="0">
               <a:latin typeface="Arial MT"/>
               <a:cs typeface="Arial MT"/>
             </a:endParaRPr>
@@ -3515,7 +3566,7 @@
               </a:rPr>
               <a:t>;</a:t>
             </a:r>
-            <a:endParaRPr sz="3200">
+            <a:endParaRPr sz="3200" dirty="0">
               <a:latin typeface="Arial MT"/>
               <a:cs typeface="Arial MT"/>
             </a:endParaRPr>
@@ -3529,7 +3580,7 @@
                 <a:spcPts val="25"/>
               </a:spcBef>
             </a:pPr>
-            <a:endParaRPr sz="3750">
+            <a:endParaRPr sz="3750" dirty="0">
               <a:latin typeface="Arial MT"/>
               <a:cs typeface="Arial MT"/>
             </a:endParaRPr>
@@ -3590,7 +3641,7 @@
               </a:rPr>
               <a:t>Class</a:t>
             </a:r>
-            <a:endParaRPr sz="4800">
+            <a:endParaRPr sz="4800" dirty="0">
               <a:latin typeface="Verdana" panose="020B0604030504040204"/>
               <a:cs typeface="Verdana" panose="020B0604030504040204"/>
             </a:endParaRPr>
@@ -3723,7 +3774,7 @@
               </a:rPr>
               <a:t>lastName</a:t>
             </a:r>
-            <a:endParaRPr sz="2600">
+            <a:endParaRPr sz="2600" dirty="0">
               <a:latin typeface="Verdana" panose="020B0604030504040204"/>
               <a:cs typeface="Verdana" panose="020B0604030504040204"/>
             </a:endParaRPr>
@@ -3786,7 +3837,7 @@
               </a:rPr>
               <a:t>setters</a:t>
             </a:r>
-            <a:endParaRPr sz="2600">
+            <a:endParaRPr sz="2600" dirty="0">
               <a:latin typeface="Verdana" panose="020B0604030504040204"/>
               <a:cs typeface="Verdana" panose="020B0604030504040204"/>
             </a:endParaRPr>
@@ -3806,9 +3857,11 @@
         <p:spPr/>
         <p:txBody>
           <a:bodyPr/>
+          <a:lstStyle/>
           <a:p>
             <a:fld id="{B6F15528-21DE-4FAA-801E-634DDDAF4B2B}" type="slidenum">
               <a:rPr/>
+              <a:t>12</a:t>
             </a:fld>
             <a:endParaRPr/>
           </a:p>
@@ -3900,7 +3953,6 @@
               <a:rPr spc="-5" dirty="0"/>
               <a:t>FriendService</a:t>
             </a:r>
-            <a:endParaRPr spc="-5" dirty="0"/>
           </a:p>
         </p:txBody>
       </p:sp>
@@ -4270,9 +4322,11 @@
         <p:spPr/>
         <p:txBody>
           <a:bodyPr/>
+          <a:lstStyle/>
           <a:p>
             <a:fld id="{B6F15528-21DE-4FAA-801E-634DDDAF4B2B}" type="slidenum">
               <a:rPr/>
+              <a:t>13</a:t>
             </a:fld>
             <a:endParaRPr/>
           </a:p>
@@ -4344,11 +4398,6 @@
               </a:rPr>
               <a:t>@RestController</a:t>
             </a:r>
-            <a:endParaRPr spc="-5" dirty="0">
-              <a:solidFill>
-                <a:srgbClr val="BBB529"/>
-              </a:solidFill>
-            </a:endParaRPr>
           </a:p>
           <a:p>
             <a:pPr marL="12700">
@@ -4400,7 +4449,6 @@
               <a:rPr dirty="0"/>
               <a:t>{</a:t>
             </a:r>
-            <a:endParaRPr dirty="0"/>
           </a:p>
         </p:txBody>
       </p:sp>
@@ -5014,9 +5062,11 @@
         <p:spPr/>
         <p:txBody>
           <a:bodyPr/>
+          <a:lstStyle/>
           <a:p>
             <a:fld id="{B6F15528-21DE-4FAA-801E-634DDDAF4B2B}" type="slidenum">
               <a:rPr/>
+              <a:t>14</a:t>
             </a:fld>
             <a:endParaRPr/>
           </a:p>
@@ -5084,7 +5134,9 @@
         <p:txBody>
           <a:bodyPr wrap="square" lIns="0" tIns="0" rIns="0" bIns="0" rtlCol="0"/>
           <a:lstStyle/>
-          <a:p/>
+          <a:p>
+            <a:endParaRPr/>
+          </a:p>
         </p:txBody>
       </p:sp>
       <p:sp>
@@ -5336,13 +5388,6 @@
               </a:rPr>
               <a:t>one</a:t>
             </a:r>
-            <a:endParaRPr spc="-5" dirty="0">
-              <a:solidFill>
-                <a:srgbClr val="5E5E5E"/>
-              </a:solidFill>
-              <a:latin typeface="Tahoma" panose="020B0604030504040204"/>
-              <a:cs typeface="Tahoma" panose="020B0604030504040204"/>
-            </a:endParaRPr>
           </a:p>
         </p:txBody>
       </p:sp>
@@ -5561,9 +5606,11 @@
         <p:spPr/>
         <p:txBody>
           <a:bodyPr/>
+          <a:lstStyle/>
           <a:p>
             <a:fld id="{B6F15528-21DE-4FAA-801E-634DDDAF4B2B}" type="slidenum">
               <a:rPr/>
+              <a:t>15</a:t>
             </a:fld>
             <a:endParaRPr/>
           </a:p>
@@ -5651,7 +5698,6 @@
               <a:rPr spc="-5" dirty="0"/>
               <a:t>)</a:t>
             </a:r>
-            <a:endParaRPr spc="-5" dirty="0"/>
           </a:p>
         </p:txBody>
       </p:sp>
@@ -6134,9 +6180,11 @@
         <p:spPr/>
         <p:txBody>
           <a:bodyPr/>
+          <a:lstStyle/>
           <a:p>
             <a:fld id="{B6F15528-21DE-4FAA-801E-634DDDAF4B2B}" type="slidenum">
               <a:rPr/>
+              <a:t>16</a:t>
             </a:fld>
             <a:endParaRPr/>
           </a:p>
@@ -6256,7 +6304,6 @@
               <a:rPr dirty="0"/>
               <a:t>{</a:t>
             </a:r>
-            <a:endParaRPr dirty="0"/>
           </a:p>
         </p:txBody>
       </p:sp>
@@ -6549,9 +6596,11 @@
         <p:spPr/>
         <p:txBody>
           <a:bodyPr/>
+          <a:lstStyle/>
           <a:p>
             <a:fld id="{B6F15528-21DE-4FAA-801E-634DDDAF4B2B}" type="slidenum">
               <a:rPr/>
+              <a:t>17</a:t>
             </a:fld>
             <a:endParaRPr/>
           </a:p>
@@ -6639,7 +6688,6 @@
               <a:rPr spc="-5" dirty="0"/>
               <a:t>)</a:t>
             </a:r>
-            <a:endParaRPr spc="-5" dirty="0"/>
           </a:p>
         </p:txBody>
       </p:sp>
@@ -7133,9 +7181,11 @@
         <p:spPr/>
         <p:txBody>
           <a:bodyPr/>
+          <a:lstStyle/>
           <a:p>
             <a:fld id="{B6F15528-21DE-4FAA-801E-634DDDAF4B2B}" type="slidenum">
               <a:rPr/>
+              <a:t>18</a:t>
             </a:fld>
             <a:endParaRPr/>
           </a:p>
@@ -7223,7 +7273,6 @@
               <a:rPr spc="-5" dirty="0"/>
               <a:t>)</a:t>
             </a:r>
-            <a:endParaRPr spc="-5" dirty="0"/>
           </a:p>
         </p:txBody>
       </p:sp>
@@ -7545,9 +7594,11 @@
         <p:spPr/>
         <p:txBody>
           <a:bodyPr/>
+          <a:lstStyle/>
           <a:p>
             <a:fld id="{B6F15528-21DE-4FAA-801E-634DDDAF4B2B}" type="slidenum">
               <a:rPr/>
+              <a:t>19</a:t>
             </a:fld>
             <a:endParaRPr/>
           </a:p>
@@ -7585,7 +7636,7 @@
           <p:nvPr/>
         </p:nvPicPr>
         <p:blipFill>
-          <a:blip r:embed="rId1" cstate="print"/>
+          <a:blip r:embed="rId2" cstate="print"/>
           <a:stretch>
             <a:fillRect/>
           </a:stretch>
@@ -7729,13 +7780,6 @@
               </a:rPr>
               <a:t>sis</a:t>
             </a:r>
-            <a:endParaRPr spc="-35" dirty="0">
-              <a:solidFill>
-                <a:srgbClr val="000000"/>
-              </a:solidFill>
-              <a:latin typeface="Verdana" panose="020B0604030504040204"/>
-              <a:cs typeface="Verdana" panose="020B0604030504040204"/>
-            </a:endParaRPr>
           </a:p>
           <a:p>
             <a:pPr marL="12700" marR="282575">
@@ -7786,13 +7830,6 @@
               </a:rPr>
               <a:t>Build</a:t>
             </a:r>
-            <a:endParaRPr spc="60" dirty="0">
-              <a:solidFill>
-                <a:srgbClr val="000000"/>
-              </a:solidFill>
-              <a:latin typeface="Verdana" panose="020B0604030504040204"/>
-              <a:cs typeface="Verdana" panose="020B0604030504040204"/>
-            </a:endParaRPr>
           </a:p>
         </p:txBody>
       </p:sp>
@@ -7856,9 +7893,11 @@
         <p:spPr/>
         <p:txBody>
           <a:bodyPr/>
+          <a:lstStyle/>
           <a:p>
             <a:fld id="{B6F15528-21DE-4FAA-801E-634DDDAF4B2B}" type="slidenum">
               <a:rPr/>
+              <a:t>2</a:t>
             </a:fld>
             <a:endParaRPr/>
           </a:p>
@@ -8191,7 +8230,7 @@
             <p:nvPr/>
           </p:nvPicPr>
           <p:blipFill>
-            <a:blip r:embed="rId1" cstate="print"/>
+            <a:blip r:embed="rId2" cstate="print"/>
             <a:stretch>
               <a:fillRect/>
             </a:stretch>
@@ -8213,7 +8252,7 @@
             <p:nvPr/>
           </p:nvPicPr>
           <p:blipFill>
-            <a:blip r:embed="rId2" cstate="print"/>
+            <a:blip r:embed="rId3" cstate="print"/>
             <a:stretch>
               <a:fillRect/>
             </a:stretch>
@@ -8282,7 +8321,7 @@
           <p:nvPr/>
         </p:nvPicPr>
         <p:blipFill>
-          <a:blip r:embed="rId3" cstate="print"/>
+          <a:blip r:embed="rId4" cstate="print"/>
           <a:stretch>
             <a:fillRect/>
           </a:stretch>
@@ -8377,7 +8416,7 @@
           <p:nvPr/>
         </p:nvPicPr>
         <p:blipFill>
-          <a:blip r:embed="rId4" cstate="print"/>
+          <a:blip r:embed="rId5" cstate="print"/>
           <a:stretch>
             <a:fillRect/>
           </a:stretch>
@@ -8448,9 +8487,11 @@
         <p:spPr/>
         <p:txBody>
           <a:bodyPr/>
+          <a:lstStyle/>
           <a:p>
             <a:fld id="{B6F15528-21DE-4FAA-801E-634DDDAF4B2B}" type="slidenum">
               <a:rPr/>
+              <a:t>20</a:t>
             </a:fld>
             <a:endParaRPr/>
           </a:p>
@@ -8518,7 +8559,9 @@
         <p:txBody>
           <a:bodyPr wrap="square" lIns="0" tIns="0" rIns="0" bIns="0" rtlCol="0"/>
           <a:lstStyle/>
-          <a:p/>
+          <a:p>
+            <a:endParaRPr/>
+          </a:p>
         </p:txBody>
       </p:sp>
       <p:sp>
@@ -8670,13 +8713,6 @@
               </a:rPr>
               <a:t>Id</a:t>
             </a:r>
-            <a:endParaRPr spc="-95" dirty="0">
-              <a:solidFill>
-                <a:srgbClr val="000000"/>
-              </a:solidFill>
-              <a:latin typeface="Verdana" panose="020B0604030504040204"/>
-              <a:cs typeface="Verdana" panose="020B0604030504040204"/>
-            </a:endParaRPr>
           </a:p>
           <a:p>
             <a:pPr marL="12700" marR="5080">
@@ -8877,13 +8913,6 @@
               </a:rPr>
               <a:t>LastName</a:t>
             </a:r>
-            <a:endParaRPr spc="15" dirty="0">
-              <a:solidFill>
-                <a:srgbClr val="000000"/>
-              </a:solidFill>
-              <a:latin typeface="Verdana" panose="020B0604030504040204"/>
-              <a:cs typeface="Verdana" panose="020B0604030504040204"/>
-            </a:endParaRPr>
           </a:p>
         </p:txBody>
       </p:sp>
@@ -8900,9 +8929,11 @@
         <p:spPr/>
         <p:txBody>
           <a:bodyPr/>
+          <a:lstStyle/>
           <a:p>
             <a:fld id="{B6F15528-21DE-4FAA-801E-634DDDAF4B2B}" type="slidenum">
               <a:rPr/>
+              <a:t>21</a:t>
             </a:fld>
             <a:endParaRPr/>
           </a:p>
@@ -8990,7 +9021,6 @@
               <a:rPr spc="-5" dirty="0"/>
               <a:t>)</a:t>
             </a:r>
-            <a:endParaRPr spc="-5" dirty="0"/>
           </a:p>
         </p:txBody>
       </p:sp>
@@ -9483,9 +9513,11 @@
         <p:spPr/>
         <p:txBody>
           <a:bodyPr/>
+          <a:lstStyle/>
           <a:p>
             <a:fld id="{B6F15528-21DE-4FAA-801E-634DDDAF4B2B}" type="slidenum">
               <a:rPr/>
+              <a:t>22</a:t>
             </a:fld>
             <a:endParaRPr/>
           </a:p>
@@ -9577,7 +9609,6 @@
               <a:rPr spc="-5" dirty="0"/>
               <a:t>FriendService</a:t>
             </a:r>
-            <a:endParaRPr spc="-5" dirty="0"/>
           </a:p>
           <a:p>
             <a:pPr marL="1725295">
@@ -9628,7 +9659,6 @@
               <a:rPr dirty="0"/>
               <a:t>{</a:t>
             </a:r>
-            <a:endParaRPr dirty="0"/>
           </a:p>
         </p:txBody>
       </p:sp>
@@ -10124,9 +10154,11 @@
         <p:spPr/>
         <p:txBody>
           <a:bodyPr/>
+          <a:lstStyle/>
           <a:p>
             <a:fld id="{B6F15528-21DE-4FAA-801E-634DDDAF4B2B}" type="slidenum">
               <a:rPr/>
+              <a:t>23</a:t>
             </a:fld>
             <a:endParaRPr/>
           </a:p>
@@ -10234,7 +10266,6 @@
               <a:rPr spc="-5" dirty="0"/>
               <a:t>(</a:t>
             </a:r>
-            <a:endParaRPr spc="-5" dirty="0"/>
           </a:p>
         </p:txBody>
       </p:sp>
@@ -10355,7 +10386,6 @@
               <a:rPr spc="-5" dirty="0"/>
               <a:t>String lastName)</a:t>
             </a:r>
-            <a:endParaRPr spc="-5" dirty="0"/>
           </a:p>
           <a:p>
             <a:pPr marL="76200">
@@ -10375,7 +10405,6 @@
               <a:rPr dirty="0"/>
               <a:t>}</a:t>
             </a:r>
-            <a:endParaRPr dirty="0"/>
           </a:p>
           <a:p>
             <a:pPr>
@@ -10812,9 +10841,11 @@
         <p:spPr/>
         <p:txBody>
           <a:bodyPr/>
+          <a:lstStyle/>
           <a:p>
             <a:fld id="{B6F15528-21DE-4FAA-801E-634DDDAF4B2B}" type="slidenum">
               <a:rPr/>
+              <a:t>24</a:t>
             </a:fld>
             <a:endParaRPr/>
           </a:p>
@@ -10974,13 +11005,6 @@
               </a:rPr>
               <a:t>Types</a:t>
             </a:r>
-            <a:endParaRPr dirty="0">
-              <a:solidFill>
-                <a:srgbClr val="000000"/>
-              </a:solidFill>
-              <a:latin typeface="Verdana" panose="020B0604030504040204"/>
-              <a:cs typeface="Verdana" panose="020B0604030504040204"/>
-            </a:endParaRPr>
           </a:p>
         </p:txBody>
       </p:sp>
@@ -11198,9 +11222,11 @@
         <p:spPr/>
         <p:txBody>
           <a:bodyPr/>
+          <a:lstStyle/>
           <a:p>
             <a:fld id="{B6F15528-21DE-4FAA-801E-634DDDAF4B2B}" type="slidenum">
               <a:rPr/>
+              <a:t>25</a:t>
             </a:fld>
             <a:endParaRPr/>
           </a:p>
@@ -11268,7 +11294,9 @@
         <p:txBody>
           <a:bodyPr wrap="square" lIns="0" tIns="0" rIns="0" bIns="0" rtlCol="0"/>
           <a:lstStyle/>
-          <a:p/>
+          <a:p>
+            <a:endParaRPr/>
+          </a:p>
         </p:txBody>
       </p:sp>
       <p:sp>
@@ -11434,13 +11462,6 @@
               </a:rPr>
               <a:t>Notation</a:t>
             </a:r>
-            <a:endParaRPr spc="60" dirty="0">
-              <a:solidFill>
-                <a:srgbClr val="000000"/>
-              </a:solidFill>
-              <a:latin typeface="Verdana" panose="020B0604030504040204"/>
-              <a:cs typeface="Verdana" panose="020B0604030504040204"/>
-            </a:endParaRPr>
           </a:p>
         </p:txBody>
       </p:sp>
@@ -11893,9 +11914,11 @@
         <p:spPr/>
         <p:txBody>
           <a:bodyPr/>
+          <a:lstStyle/>
           <a:p>
             <a:fld id="{B6F15528-21DE-4FAA-801E-634DDDAF4B2B}" type="slidenum">
               <a:rPr/>
+              <a:t>26</a:t>
             </a:fld>
             <a:endParaRPr/>
           </a:p>
@@ -11963,7 +11986,9 @@
         <p:txBody>
           <a:bodyPr wrap="square" lIns="0" tIns="0" rIns="0" bIns="0" rtlCol="0"/>
           <a:lstStyle/>
-          <a:p/>
+          <a:p>
+            <a:endParaRPr/>
+          </a:p>
         </p:txBody>
       </p:sp>
       <p:sp>
@@ -12109,7 +12134,6 @@
               <a:rPr spc="130" dirty="0"/>
               <a:t>JSON</a:t>
             </a:r>
-            <a:endParaRPr spc="130" dirty="0"/>
           </a:p>
           <a:p>
             <a:pPr marL="139700" marR="2033905" indent="-127000">
@@ -13008,9 +13032,11 @@
         <p:spPr/>
         <p:txBody>
           <a:bodyPr/>
+          <a:lstStyle/>
           <a:p>
             <a:fld id="{B6F15528-21DE-4FAA-801E-634DDDAF4B2B}" type="slidenum">
               <a:rPr/>
+              <a:t>27</a:t>
             </a:fld>
             <a:endParaRPr/>
           </a:p>
@@ -13078,7 +13104,9 @@
         <p:txBody>
           <a:bodyPr wrap="square" lIns="0" tIns="0" rIns="0" bIns="0" rtlCol="0"/>
           <a:lstStyle/>
-          <a:p/>
+          <a:p>
+            <a:endParaRPr/>
+          </a:p>
         </p:txBody>
       </p:sp>
       <p:sp>
@@ -13297,14 +13325,7 @@
                 <a:latin typeface="Verdana" panose="020B0604030504040204"/>
                 <a:cs typeface="Verdana" panose="020B0604030504040204"/>
               </a:rPr>
-              <a:t> </a:t>
-            </a:r>
-            <a:r>
-              <a:rPr sz="2600" spc="15" dirty="0">
-                <a:latin typeface="Verdana" panose="020B0604030504040204"/>
-                <a:cs typeface="Verdana" panose="020B0604030504040204"/>
-              </a:rPr>
-              <a:t>@JsonIgno</a:t>
+              <a:t> @JsonIgno</a:t>
             </a:r>
             <a:r>
               <a:rPr sz="2600" spc="-40" dirty="0">
@@ -13858,9 +13879,11 @@
         <p:spPr/>
         <p:txBody>
           <a:bodyPr/>
+          <a:lstStyle/>
           <a:p>
             <a:fld id="{B6F15528-21DE-4FAA-801E-634DDDAF4B2B}" type="slidenum">
               <a:rPr/>
+              <a:t>28</a:t>
             </a:fld>
             <a:endParaRPr/>
           </a:p>
@@ -13898,7 +13921,7 @@
           <p:nvPr/>
         </p:nvPicPr>
         <p:blipFill>
-          <a:blip r:embed="rId1" cstate="print"/>
+          <a:blip r:embed="rId2" cstate="print"/>
           <a:stretch>
             <a:fillRect/>
           </a:stretch>
@@ -14022,13 +14045,6 @@
               </a:rPr>
               <a:t>Properties</a:t>
             </a:r>
-            <a:endParaRPr spc="40" dirty="0">
-              <a:solidFill>
-                <a:srgbClr val="000000"/>
-              </a:solidFill>
-              <a:latin typeface="Verdana" panose="020B0604030504040204"/>
-              <a:cs typeface="Verdana" panose="020B0604030504040204"/>
-            </a:endParaRPr>
           </a:p>
           <a:p>
             <a:pPr marL="12700" marR="806450">
@@ -14109,13 +14125,6 @@
               </a:rPr>
               <a:t>Relation</a:t>
             </a:r>
-            <a:endParaRPr spc="30" dirty="0">
-              <a:solidFill>
-                <a:srgbClr val="000000"/>
-              </a:solidFill>
-              <a:latin typeface="Verdana" panose="020B0604030504040204"/>
-              <a:cs typeface="Verdana" panose="020B0604030504040204"/>
-            </a:endParaRPr>
           </a:p>
         </p:txBody>
       </p:sp>
@@ -14285,9 +14294,11 @@
         <p:spPr/>
         <p:txBody>
           <a:bodyPr/>
+          <a:lstStyle/>
           <a:p>
             <a:fld id="{B6F15528-21DE-4FAA-801E-634DDDAF4B2B}" type="slidenum">
               <a:rPr/>
+              <a:t>29</a:t>
             </a:fld>
             <a:endParaRPr/>
           </a:p>
@@ -14952,7 +14963,7 @@
           <p:nvPr/>
         </p:nvPicPr>
         <p:blipFill>
-          <a:blip r:embed="rId1" cstate="print"/>
+          <a:blip r:embed="rId2" cstate="print"/>
           <a:stretch>
             <a:fillRect/>
           </a:stretch>
@@ -14980,9 +14991,11 @@
         <p:spPr/>
         <p:txBody>
           <a:bodyPr/>
+          <a:lstStyle/>
           <a:p>
             <a:fld id="{B6F15528-21DE-4FAA-801E-634DDDAF4B2B}" type="slidenum">
               <a:rPr/>
+              <a:t>3</a:t>
             </a:fld>
             <a:endParaRPr/>
           </a:p>
@@ -15522,9 +15535,11 @@
         <p:spPr/>
         <p:txBody>
           <a:bodyPr/>
+          <a:lstStyle/>
           <a:p>
             <a:fld id="{B6F15528-21DE-4FAA-801E-634DDDAF4B2B}" type="slidenum">
               <a:rPr/>
+              <a:t>30</a:t>
             </a:fld>
             <a:endParaRPr/>
           </a:p>
@@ -16402,9 +16417,11 @@
         <p:spPr/>
         <p:txBody>
           <a:bodyPr/>
+          <a:lstStyle/>
           <a:p>
             <a:fld id="{B6F15528-21DE-4FAA-801E-634DDDAF4B2B}" type="slidenum">
               <a:rPr/>
+              <a:t>31</a:t>
             </a:fld>
             <a:endParaRPr/>
           </a:p>
@@ -16442,7 +16459,7 @@
           <p:nvPr/>
         </p:nvPicPr>
         <p:blipFill>
-          <a:blip r:embed="rId1" cstate="print"/>
+          <a:blip r:embed="rId2" cstate="print"/>
           <a:stretch>
             <a:fillRect/>
           </a:stretch>
@@ -16566,13 +16583,6 @@
               </a:rPr>
               <a:t>oject</a:t>
             </a:r>
-            <a:endParaRPr spc="40" dirty="0">
-              <a:solidFill>
-                <a:srgbClr val="000000"/>
-              </a:solidFill>
-              <a:latin typeface="Verdana" panose="020B0604030504040204"/>
-              <a:cs typeface="Verdana" panose="020B0604030504040204"/>
-            </a:endParaRPr>
           </a:p>
         </p:txBody>
       </p:sp>
@@ -16820,9 +16830,11 @@
         <p:spPr/>
         <p:txBody>
           <a:bodyPr/>
+          <a:lstStyle/>
           <a:p>
             <a:fld id="{B6F15528-21DE-4FAA-801E-634DDDAF4B2B}" type="slidenum">
               <a:rPr/>
+              <a:t>32</a:t>
             </a:fld>
             <a:endParaRPr/>
           </a:p>
@@ -16890,7 +16902,9 @@
         <p:txBody>
           <a:bodyPr wrap="square" lIns="0" tIns="0" rIns="0" bIns="0" rtlCol="0"/>
           <a:lstStyle/>
-          <a:p/>
+          <a:p>
+            <a:endParaRPr/>
+          </a:p>
         </p:txBody>
       </p:sp>
       <p:sp>
@@ -17105,13 +17119,6 @@
               </a:rPr>
               <a:t>to:</a:t>
             </a:r>
-            <a:endParaRPr dirty="0">
-              <a:solidFill>
-                <a:srgbClr val="5E5E5E"/>
-              </a:solidFill>
-              <a:latin typeface="Tahoma" panose="020B0604030504040204"/>
-              <a:cs typeface="Tahoma" panose="020B0604030504040204"/>
-            </a:endParaRPr>
           </a:p>
         </p:txBody>
       </p:sp>
@@ -17482,9 +17489,11 @@
         <p:spPr/>
         <p:txBody>
           <a:bodyPr/>
+          <a:lstStyle/>
           <a:p>
             <a:fld id="{B6F15528-21DE-4FAA-801E-634DDDAF4B2B}" type="slidenum">
               <a:rPr/>
+              <a:t>4</a:t>
             </a:fld>
             <a:endParaRPr/>
           </a:p>
@@ -17552,7 +17561,9 @@
         <p:txBody>
           <a:bodyPr wrap="square" lIns="0" tIns="0" rIns="0" bIns="0" rtlCol="0"/>
           <a:lstStyle/>
-          <a:p/>
+          <a:p>
+            <a:endParaRPr/>
+          </a:p>
         </p:txBody>
       </p:sp>
       <p:sp>
@@ -17664,13 +17675,6 @@
               </a:rPr>
               <a:t>architecture</a:t>
             </a:r>
-            <a:endParaRPr spc="-5" dirty="0">
-              <a:solidFill>
-                <a:srgbClr val="5E5E5E"/>
-              </a:solidFill>
-              <a:latin typeface="Tahoma" panose="020B0604030504040204"/>
-              <a:cs typeface="Tahoma" panose="020B0604030504040204"/>
-            </a:endParaRPr>
           </a:p>
         </p:txBody>
       </p:sp>
@@ -17998,9 +18002,11 @@
         <p:spPr/>
         <p:txBody>
           <a:bodyPr/>
+          <a:lstStyle/>
           <a:p>
             <a:fld id="{B6F15528-21DE-4FAA-801E-634DDDAF4B2B}" type="slidenum">
               <a:rPr/>
+              <a:t>5</a:t>
             </a:fld>
             <a:endParaRPr/>
           </a:p>
@@ -18361,7 +18367,9 @@
           <p:txBody>
             <a:bodyPr wrap="square" lIns="0" tIns="0" rIns="0" bIns="0" rtlCol="0"/>
             <a:lstStyle/>
-            <a:p/>
+            <a:p>
+              <a:endParaRPr/>
+            </a:p>
           </p:txBody>
         </p:sp>
         <p:sp>
@@ -18406,7 +18414,9 @@
           <p:txBody>
             <a:bodyPr wrap="square" lIns="0" tIns="0" rIns="0" bIns="0" rtlCol="0"/>
             <a:lstStyle/>
-            <a:p/>
+            <a:p>
+              <a:endParaRPr/>
+            </a:p>
           </p:txBody>
         </p:sp>
         <p:pic>
@@ -18416,7 +18426,7 @@
             <p:nvPr/>
           </p:nvPicPr>
           <p:blipFill>
-            <a:blip r:embed="rId1" cstate="print"/>
+            <a:blip r:embed="rId2" cstate="print"/>
             <a:stretch>
               <a:fillRect/>
             </a:stretch>
@@ -18478,7 +18488,9 @@
           <p:txBody>
             <a:bodyPr wrap="square" lIns="0" tIns="0" rIns="0" bIns="0" rtlCol="0"/>
             <a:lstStyle/>
-            <a:p/>
+            <a:p>
+              <a:endParaRPr/>
+            </a:p>
           </p:txBody>
         </p:sp>
         <p:sp>
@@ -18587,7 +18599,9 @@
           <p:txBody>
             <a:bodyPr wrap="square" lIns="0" tIns="0" rIns="0" bIns="0" rtlCol="0"/>
             <a:lstStyle/>
-            <a:p/>
+            <a:p>
+              <a:endParaRPr/>
+            </a:p>
           </p:txBody>
         </p:sp>
         <p:sp>
@@ -18632,7 +18646,9 @@
           <p:txBody>
             <a:bodyPr wrap="square" lIns="0" tIns="0" rIns="0" bIns="0" rtlCol="0"/>
             <a:lstStyle/>
-            <a:p/>
+            <a:p>
+              <a:endParaRPr/>
+            </a:p>
           </p:txBody>
         </p:sp>
         <p:pic>
@@ -18642,7 +18658,7 @@
             <p:nvPr/>
           </p:nvPicPr>
           <p:blipFill>
-            <a:blip r:embed="rId2" cstate="print"/>
+            <a:blip r:embed="rId3" cstate="print"/>
             <a:stretch>
               <a:fillRect/>
             </a:stretch>
@@ -18664,7 +18680,7 @@
             <p:nvPr/>
           </p:nvPicPr>
           <p:blipFill>
-            <a:blip r:embed="rId3" cstate="print"/>
+            <a:blip r:embed="rId4" cstate="print"/>
             <a:stretch>
               <a:fillRect/>
             </a:stretch>
@@ -18714,7 +18730,7 @@
                 <a:latin typeface="Verdana" panose="020B0604030504040204"/>
                 <a:cs typeface="Verdana" panose="020B0604030504040204"/>
               </a:rPr>
-              <a:t>My</a:t>
+              <a:t>Postgre</a:t>
             </a:r>
             <a:r>
               <a:rPr sz="3200" spc="65" dirty="0">
@@ -18723,7 +18739,7 @@
               </a:rPr>
               <a:t>SQL</a:t>
             </a:r>
-            <a:endParaRPr sz="3200">
+            <a:endParaRPr sz="3200" dirty="0">
               <a:latin typeface="Verdana" panose="020B0604030504040204"/>
               <a:cs typeface="Verdana" panose="020B0604030504040204"/>
             </a:endParaRPr>
@@ -18875,7 +18891,7 @@
         </p:nvGraphicFramePr>
         <p:xfrm>
           <a:off x="6778448" y="2347978"/>
-          <a:ext cx="2330450" cy="2111375"/>
+          <a:ext cx="2253615" cy="2205233"/>
         </p:xfrm>
         <a:graphic>
           <a:graphicData uri="http://schemas.openxmlformats.org/drawingml/2006/table">
@@ -18884,7 +18900,13 @@
                 <a:tableStyleId>{2D5ABB26-0587-4C30-8999-92F81FD0307C}</a:tableStyleId>
               </a:tblPr>
               <a:tblGrid>
-                <a:gridCol w="2253615"/>
+                <a:gridCol w="2253615">
+                  <a:extLst>
+                    <a:ext uri="{9D8B030D-6E8A-4147-A177-3AD203B41FA5}">
+                      <a16:colId xmlns:a16="http://schemas.microsoft.com/office/drawing/2014/main" val="20000"/>
+                    </a:ext>
+                  </a:extLst>
+                </a:gridCol>
               </a:tblGrid>
               <a:tr h="827918">
                 <a:tc>
@@ -18964,6 +18986,11 @@
                     </a:lnB>
                   </a:tcPr>
                 </a:tc>
+                <a:extLst>
+                  <a:ext uri="{0D108BD9-81ED-4DB2-BD59-A6C34878D82A}">
+                    <a16:rowId xmlns:a16="http://schemas.microsoft.com/office/drawing/2014/main" val="10000"/>
+                  </a:ext>
+                </a:extLst>
               </a:tr>
               <a:tr h="1023467">
                 <a:tc>
@@ -19072,6 +19099,11 @@
                     </a:lnB>
                   </a:tcPr>
                 </a:tc>
+                <a:extLst>
+                  <a:ext uri="{0D108BD9-81ED-4DB2-BD59-A6C34878D82A}">
+                    <a16:rowId xmlns:a16="http://schemas.microsoft.com/office/drawing/2014/main" val="10001"/>
+                  </a:ext>
+                </a:extLst>
               </a:tr>
               <a:tr h="208851">
                 <a:tc>
@@ -19117,6 +19149,11 @@
                     </a:lnB>
                   </a:tcPr>
                 </a:tc>
+                <a:extLst>
+                  <a:ext uri="{0D108BD9-81ED-4DB2-BD59-A6C34878D82A}">
+                    <a16:rowId xmlns:a16="http://schemas.microsoft.com/office/drawing/2014/main" val="10002"/>
+                  </a:ext>
+                </a:extLst>
               </a:tr>
             </a:tbl>
           </a:graphicData>
@@ -19129,7 +19166,7 @@
           <p:nvPr/>
         </p:nvPicPr>
         <p:blipFill>
-          <a:blip r:embed="rId4" cstate="print"/>
+          <a:blip r:embed="rId5" cstate="print"/>
           <a:stretch>
             <a:fillRect/>
           </a:stretch>
@@ -19165,7 +19202,7 @@
             <p:nvPr/>
           </p:nvPicPr>
           <p:blipFill>
-            <a:blip r:embed="rId5" cstate="print"/>
+            <a:blip r:embed="rId6" cstate="print"/>
             <a:stretch>
               <a:fillRect/>
             </a:stretch>
@@ -19225,7 +19262,9 @@
           <p:txBody>
             <a:bodyPr wrap="square" lIns="0" tIns="0" rIns="0" bIns="0" rtlCol="0"/>
             <a:lstStyle/>
-            <a:p/>
+            <a:p>
+              <a:endParaRPr/>
+            </a:p>
           </p:txBody>
         </p:sp>
         <p:sp>
@@ -19275,7 +19314,9 @@
           <p:txBody>
             <a:bodyPr wrap="square" lIns="0" tIns="0" rIns="0" bIns="0" rtlCol="0"/>
             <a:lstStyle/>
-            <a:p/>
+            <a:p>
+              <a:endParaRPr/>
+            </a:p>
           </p:txBody>
         </p:sp>
       </p:grpSp>
@@ -19461,7 +19502,9 @@
           <p:txBody>
             <a:bodyPr wrap="square" lIns="0" tIns="0" rIns="0" bIns="0" rtlCol="0"/>
             <a:lstStyle/>
-            <a:p/>
+            <a:p>
+              <a:endParaRPr/>
+            </a:p>
           </p:txBody>
         </p:sp>
         <p:sp>
@@ -19509,7 +19552,9 @@
           <p:txBody>
             <a:bodyPr wrap="square" lIns="0" tIns="0" rIns="0" bIns="0" rtlCol="0"/>
             <a:lstStyle/>
-            <a:p/>
+            <a:p>
+              <a:endParaRPr/>
+            </a:p>
           </p:txBody>
         </p:sp>
       </p:grpSp>
@@ -19643,7 +19688,7 @@
             <p:nvPr/>
           </p:nvPicPr>
           <p:blipFill>
-            <a:blip r:embed="rId6" cstate="print"/>
+            <a:blip r:embed="rId7" cstate="print"/>
             <a:stretch>
               <a:fillRect/>
             </a:stretch>
@@ -19703,7 +19748,9 @@
           <p:txBody>
             <a:bodyPr wrap="square" lIns="0" tIns="0" rIns="0" bIns="0" rtlCol="0"/>
             <a:lstStyle/>
-            <a:p/>
+            <a:p>
+              <a:endParaRPr/>
+            </a:p>
           </p:txBody>
         </p:sp>
         <p:sp>
@@ -19753,7 +19800,9 @@
           <p:txBody>
             <a:bodyPr wrap="square" lIns="0" tIns="0" rIns="0" bIns="0" rtlCol="0"/>
             <a:lstStyle/>
-            <a:p/>
+            <a:p>
+              <a:endParaRPr/>
+            </a:p>
           </p:txBody>
         </p:sp>
       </p:grpSp>
@@ -19929,7 +19978,9 @@
           <p:txBody>
             <a:bodyPr wrap="square" lIns="0" tIns="0" rIns="0" bIns="0" rtlCol="0"/>
             <a:lstStyle/>
-            <a:p/>
+            <a:p>
+              <a:endParaRPr/>
+            </a:p>
           </p:txBody>
         </p:sp>
         <p:sp>
@@ -19977,7 +20028,9 @@
           <p:txBody>
             <a:bodyPr wrap="square" lIns="0" tIns="0" rIns="0" bIns="0" rtlCol="0"/>
             <a:lstStyle/>
-            <a:p/>
+            <a:p>
+              <a:endParaRPr/>
+            </a:p>
           </p:txBody>
         </p:sp>
       </p:grpSp>
@@ -20073,9 +20126,11 @@
         <p:spPr/>
         <p:txBody>
           <a:bodyPr/>
+          <a:lstStyle/>
           <a:p>
             <a:fld id="{B6F15528-21DE-4FAA-801E-634DDDAF4B2B}" type="slidenum">
               <a:rPr/>
+              <a:t>6</a:t>
             </a:fld>
             <a:endParaRPr/>
           </a:p>
@@ -20143,7 +20198,9 @@
         <p:txBody>
           <a:bodyPr wrap="square" lIns="0" tIns="0" rIns="0" bIns="0" rtlCol="0"/>
           <a:lstStyle/>
-          <a:p/>
+          <a:p>
+            <a:endParaRPr/>
+          </a:p>
         </p:txBody>
       </p:sp>
       <p:sp>
@@ -20255,13 +20312,6 @@
               </a:rPr>
               <a:t>Database</a:t>
             </a:r>
-            <a:endParaRPr spc="-5" dirty="0">
-              <a:solidFill>
-                <a:srgbClr val="5E5E5E"/>
-              </a:solidFill>
-              <a:latin typeface="Tahoma" panose="020B0604030504040204"/>
-              <a:cs typeface="Tahoma" panose="020B0604030504040204"/>
-            </a:endParaRPr>
           </a:p>
         </p:txBody>
       </p:sp>
@@ -20480,9 +20530,11 @@
         <p:spPr/>
         <p:txBody>
           <a:bodyPr/>
+          <a:lstStyle/>
           <a:p>
             <a:fld id="{B6F15528-21DE-4FAA-801E-634DDDAF4B2B}" type="slidenum">
               <a:rPr/>
+              <a:t>7</a:t>
             </a:fld>
             <a:endParaRPr/>
           </a:p>
@@ -20736,9 +20788,11 @@
         <p:spPr/>
         <p:txBody>
           <a:bodyPr/>
+          <a:lstStyle/>
           <a:p>
             <a:fld id="{B6F15528-21DE-4FAA-801E-634DDDAF4B2B}" type="slidenum">
               <a:rPr/>
+              <a:t>8</a:t>
             </a:fld>
             <a:endParaRPr/>
           </a:p>
@@ -20806,7 +20860,9 @@
         <p:txBody>
           <a:bodyPr wrap="square" lIns="0" tIns="0" rIns="0" bIns="0" rtlCol="0"/>
           <a:lstStyle/>
-          <a:p/>
+          <a:p>
+            <a:endParaRPr/>
+          </a:p>
         </p:txBody>
       </p:sp>
       <p:sp>
@@ -20868,11 +20924,6 @@
               </a:rPr>
               <a:t>&gt;</a:t>
             </a:r>
-            <a:endParaRPr spc="-5" dirty="0">
-              <a:solidFill>
-                <a:srgbClr val="000000"/>
-              </a:solidFill>
-            </a:endParaRPr>
           </a:p>
         </p:txBody>
       </p:sp>
@@ -21404,9 +21455,11 @@
         <p:spPr/>
         <p:txBody>
           <a:bodyPr/>
+          <a:lstStyle/>
           <a:p>
             <a:fld id="{B6F15528-21DE-4FAA-801E-634DDDAF4B2B}" type="slidenum">
               <a:rPr/>
+              <a:t>9</a:t>
             </a:fld>
             <a:endParaRPr/>
           </a:p>
@@ -21698,6 +21751,8 @@
       </a:bgFillStyleLst>
     </a:fmtScheme>
   </a:themeElements>
+  <a:objectDefaults/>
+  <a:extraClrSchemeLst/>
   <a:extLst>
     <a:ext uri="{05A4C25C-085E-4340-85A3-A5531E510DB2}">
       <thm15:themeFamily xmlns:thm15="http://schemas.microsoft.com/office/thememl/2012/main" name="Office Theme" id="{62F939B6-93AF-4DB8-9C6B-D6C7DFDC589F}" vid="{4A3C46E8-61CC-4603-A589-7422A47A8E4A}"/>
@@ -21957,6 +22012,8 @@
       </a:bgFillStyleLst>
     </a:fmtScheme>
   </a:themeElements>
+  <a:objectDefaults/>
+  <a:extraClrSchemeLst/>
   <a:extLst>
     <a:ext uri="{05A4C25C-085E-4340-85A3-A5531E510DB2}">
       <thm15:themeFamily xmlns:thm15="http://schemas.microsoft.com/office/thememl/2012/main" name="Office Theme" id="{62F939B6-93AF-4DB8-9C6B-D6C7DFDC589F}" vid="{4A3C46E8-61CC-4603-A589-7422A47A8E4A}"/>

</xml_diff>